<commit_message>
updated recent researches in nlp and bioinformatics.
</commit_message>
<xml_diff>
--- a/docs/Sequence Processing.pptx
+++ b/docs/Sequence Processing.pptx
@@ -9,31 +9,32 @@
     <p:sldId id="286" r:id="rId3"/>
     <p:sldId id="285" r:id="rId4"/>
     <p:sldId id="284" r:id="rId5"/>
-    <p:sldId id="279" r:id="rId6"/>
-    <p:sldId id="283" r:id="rId7"/>
-    <p:sldId id="280" r:id="rId8"/>
-    <p:sldId id="282" r:id="rId9"/>
-    <p:sldId id="281" r:id="rId10"/>
-    <p:sldId id="268" r:id="rId11"/>
-    <p:sldId id="272" r:id="rId12"/>
-    <p:sldId id="271" r:id="rId13"/>
-    <p:sldId id="276" r:id="rId14"/>
-    <p:sldId id="270" r:id="rId15"/>
-    <p:sldId id="269" r:id="rId16"/>
-    <p:sldId id="273" r:id="rId17"/>
-    <p:sldId id="278" r:id="rId18"/>
-    <p:sldId id="274" r:id="rId19"/>
-    <p:sldId id="277" r:id="rId20"/>
-    <p:sldId id="262" r:id="rId21"/>
-    <p:sldId id="263" r:id="rId22"/>
-    <p:sldId id="264" r:id="rId23"/>
-    <p:sldId id="265" r:id="rId24"/>
-    <p:sldId id="266" r:id="rId25"/>
-    <p:sldId id="261" r:id="rId26"/>
-    <p:sldId id="258" r:id="rId27"/>
-    <p:sldId id="260" r:id="rId28"/>
-    <p:sldId id="259" r:id="rId29"/>
-    <p:sldId id="275" r:id="rId30"/>
+    <p:sldId id="287" r:id="rId6"/>
+    <p:sldId id="279" r:id="rId7"/>
+    <p:sldId id="283" r:id="rId8"/>
+    <p:sldId id="280" r:id="rId9"/>
+    <p:sldId id="282" r:id="rId10"/>
+    <p:sldId id="281" r:id="rId11"/>
+    <p:sldId id="268" r:id="rId12"/>
+    <p:sldId id="272" r:id="rId13"/>
+    <p:sldId id="271" r:id="rId14"/>
+    <p:sldId id="276" r:id="rId15"/>
+    <p:sldId id="270" r:id="rId16"/>
+    <p:sldId id="269" r:id="rId17"/>
+    <p:sldId id="273" r:id="rId18"/>
+    <p:sldId id="278" r:id="rId19"/>
+    <p:sldId id="274" r:id="rId20"/>
+    <p:sldId id="277" r:id="rId21"/>
+    <p:sldId id="262" r:id="rId22"/>
+    <p:sldId id="263" r:id="rId23"/>
+    <p:sldId id="264" r:id="rId24"/>
+    <p:sldId id="265" r:id="rId25"/>
+    <p:sldId id="266" r:id="rId26"/>
+    <p:sldId id="261" r:id="rId27"/>
+    <p:sldId id="258" r:id="rId28"/>
+    <p:sldId id="260" r:id="rId29"/>
+    <p:sldId id="259" r:id="rId30"/>
+    <p:sldId id="275" r:id="rId31"/>
   </p:sldIdLst>
   <p:sldSz cx="12192000" cy="6858000"/>
   <p:notesSz cx="6858000" cy="9144000"/>
@@ -8041,7 +8042,7 @@
           <a:p>
             <a:fld id="{6E2C99EB-405F-4656-B2F5-CFB36F1A1173}" type="datetimeFigureOut">
               <a:rPr lang="en-ID" smtClean="0"/>
-              <a:t>02/09/2021</a:t>
+              <a:t>07/09/2021</a:t>
             </a:fld>
             <a:endParaRPr lang="en-ID"/>
           </a:p>
@@ -8241,7 +8242,7 @@
           <a:p>
             <a:fld id="{6E2C99EB-405F-4656-B2F5-CFB36F1A1173}" type="datetimeFigureOut">
               <a:rPr lang="en-ID" smtClean="0"/>
-              <a:t>02/09/2021</a:t>
+              <a:t>07/09/2021</a:t>
             </a:fld>
             <a:endParaRPr lang="en-ID"/>
           </a:p>
@@ -8451,7 +8452,7 @@
           <a:p>
             <a:fld id="{6E2C99EB-405F-4656-B2F5-CFB36F1A1173}" type="datetimeFigureOut">
               <a:rPr lang="en-ID" smtClean="0"/>
-              <a:t>02/09/2021</a:t>
+              <a:t>07/09/2021</a:t>
             </a:fld>
             <a:endParaRPr lang="en-ID"/>
           </a:p>
@@ -8651,7 +8652,7 @@
           <a:p>
             <a:fld id="{6E2C99EB-405F-4656-B2F5-CFB36F1A1173}" type="datetimeFigureOut">
               <a:rPr lang="en-ID" smtClean="0"/>
-              <a:t>02/09/2021</a:t>
+              <a:t>07/09/2021</a:t>
             </a:fld>
             <a:endParaRPr lang="en-ID"/>
           </a:p>
@@ -8927,7 +8928,7 @@
           <a:p>
             <a:fld id="{6E2C99EB-405F-4656-B2F5-CFB36F1A1173}" type="datetimeFigureOut">
               <a:rPr lang="en-ID" smtClean="0"/>
-              <a:t>02/09/2021</a:t>
+              <a:t>07/09/2021</a:t>
             </a:fld>
             <a:endParaRPr lang="en-ID"/>
           </a:p>
@@ -9195,7 +9196,7 @@
           <a:p>
             <a:fld id="{6E2C99EB-405F-4656-B2F5-CFB36F1A1173}" type="datetimeFigureOut">
               <a:rPr lang="en-ID" smtClean="0"/>
-              <a:t>02/09/2021</a:t>
+              <a:t>07/09/2021</a:t>
             </a:fld>
             <a:endParaRPr lang="en-ID"/>
           </a:p>
@@ -9610,7 +9611,7 @@
           <a:p>
             <a:fld id="{6E2C99EB-405F-4656-B2F5-CFB36F1A1173}" type="datetimeFigureOut">
               <a:rPr lang="en-ID" smtClean="0"/>
-              <a:t>02/09/2021</a:t>
+              <a:t>07/09/2021</a:t>
             </a:fld>
             <a:endParaRPr lang="en-ID"/>
           </a:p>
@@ -9752,7 +9753,7 @@
           <a:p>
             <a:fld id="{6E2C99EB-405F-4656-B2F5-CFB36F1A1173}" type="datetimeFigureOut">
               <a:rPr lang="en-ID" smtClean="0"/>
-              <a:t>02/09/2021</a:t>
+              <a:t>07/09/2021</a:t>
             </a:fld>
             <a:endParaRPr lang="en-ID"/>
           </a:p>
@@ -9865,7 +9866,7 @@
           <a:p>
             <a:fld id="{6E2C99EB-405F-4656-B2F5-CFB36F1A1173}" type="datetimeFigureOut">
               <a:rPr lang="en-ID" smtClean="0"/>
-              <a:t>02/09/2021</a:t>
+              <a:t>07/09/2021</a:t>
             </a:fld>
             <a:endParaRPr lang="en-ID"/>
           </a:p>
@@ -10178,7 +10179,7 @@
           <a:p>
             <a:fld id="{6E2C99EB-405F-4656-B2F5-CFB36F1A1173}" type="datetimeFigureOut">
               <a:rPr lang="en-ID" smtClean="0"/>
-              <a:t>02/09/2021</a:t>
+              <a:t>07/09/2021</a:t>
             </a:fld>
             <a:endParaRPr lang="en-ID"/>
           </a:p>
@@ -10467,7 +10468,7 @@
           <a:p>
             <a:fld id="{6E2C99EB-405F-4656-B2F5-CFB36F1A1173}" type="datetimeFigureOut">
               <a:rPr lang="en-ID" smtClean="0"/>
-              <a:t>02/09/2021</a:t>
+              <a:t>07/09/2021</a:t>
             </a:fld>
             <a:endParaRPr lang="en-ID"/>
           </a:p>
@@ -10710,7 +10711,7 @@
           <a:p>
             <a:fld id="{6E2C99EB-405F-4656-B2F5-CFB36F1A1173}" type="datetimeFigureOut">
               <a:rPr lang="en-ID" smtClean="0"/>
-              <a:t>02/09/2021</a:t>
+              <a:t>07/09/2021</a:t>
             </a:fld>
             <a:endParaRPr lang="en-ID"/>
           </a:p>
@@ -11217,6 +11218,90 @@
       </p:grpSpPr>
       <p:sp>
         <p:nvSpPr>
+          <p:cNvPr id="4" name="Title 3">
+            <a:extLst>
+              <a:ext uri="{FF2B5EF4-FFF2-40B4-BE49-F238E27FC236}">
+                <a16:creationId xmlns:a16="http://schemas.microsoft.com/office/drawing/2014/main" id="{E6CEEF64-A8BD-446D-A249-7B2C71B0E6EA}"/>
+              </a:ext>
+            </a:extLst>
+          </p:cNvPr>
+          <p:cNvSpPr>
+            <a:spLocks noGrp="1"/>
+          </p:cNvSpPr>
+          <p:nvPr>
+            <p:ph type="ctrTitle"/>
+          </p:nvPr>
+        </p:nvSpPr>
+        <p:spPr/>
+        <p:txBody>
+          <a:bodyPr/>
+          <a:lstStyle/>
+          <a:p>
+            <a:r>
+              <a:rPr lang="en-US" dirty="0"/>
+              <a:t>Fin</a:t>
+            </a:r>
+            <a:endParaRPr lang="en-ID" dirty="0"/>
+          </a:p>
+        </p:txBody>
+      </p:sp>
+      <p:sp>
+        <p:nvSpPr>
+          <p:cNvPr id="5" name="Subtitle 4">
+            <a:extLst>
+              <a:ext uri="{FF2B5EF4-FFF2-40B4-BE49-F238E27FC236}">
+                <a16:creationId xmlns:a16="http://schemas.microsoft.com/office/drawing/2014/main" id="{FAD6DC0B-3EF1-45AC-AD1D-595B4A6A0D56}"/>
+              </a:ext>
+            </a:extLst>
+          </p:cNvPr>
+          <p:cNvSpPr>
+            <a:spLocks noGrp="1"/>
+          </p:cNvSpPr>
+          <p:nvPr>
+            <p:ph type="subTitle" idx="1"/>
+          </p:nvPr>
+        </p:nvSpPr>
+        <p:spPr/>
+        <p:txBody>
+          <a:bodyPr/>
+          <a:lstStyle/>
+          <a:p>
+            <a:endParaRPr lang="en-ID"/>
+          </a:p>
+        </p:txBody>
+      </p:sp>
+    </p:spTree>
+    <p:extLst>
+      <p:ext uri="{BB962C8B-B14F-4D97-AF65-F5344CB8AC3E}">
+        <p14:creationId xmlns:p14="http://schemas.microsoft.com/office/powerpoint/2010/main" val="3241407712"/>
+      </p:ext>
+    </p:extLst>
+  </p:cSld>
+  <p:clrMapOvr>
+    <a:masterClrMapping/>
+  </p:clrMapOvr>
+</p:sld>
+</file>
+
+<file path=ppt/slides/slide11.xml><?xml version="1.0" encoding="utf-8"?>
+<p:sld xmlns:a="http://schemas.openxmlformats.org/drawingml/2006/main" xmlns:r="http://schemas.openxmlformats.org/officeDocument/2006/relationships" xmlns:p="http://schemas.openxmlformats.org/presentationml/2006/main">
+  <p:cSld>
+    <p:spTree>
+      <p:nvGrpSpPr>
+        <p:cNvPr id="1" name=""/>
+        <p:cNvGrpSpPr/>
+        <p:nvPr/>
+      </p:nvGrpSpPr>
+      <p:grpSpPr>
+        <a:xfrm>
+          <a:off x="0" y="0"/>
+          <a:ext cx="0" cy="0"/>
+          <a:chOff x="0" y="0"/>
+          <a:chExt cx="0" cy="0"/>
+        </a:xfrm>
+      </p:grpSpPr>
+      <p:sp>
+        <p:nvSpPr>
           <p:cNvPr id="2" name="Title 1">
             <a:extLst>
               <a:ext uri="{FF2B5EF4-FFF2-40B4-BE49-F238E27FC236}">
@@ -11524,7 +11609,7 @@
 </p:sld>
 </file>
 
-<file path=ppt/slides/slide11.xml><?xml version="1.0" encoding="utf-8"?>
+<file path=ppt/slides/slide12.xml><?xml version="1.0" encoding="utf-8"?>
 <p:sld xmlns:a="http://schemas.openxmlformats.org/drawingml/2006/main" xmlns:r="http://schemas.openxmlformats.org/officeDocument/2006/relationships" xmlns:p="http://schemas.openxmlformats.org/presentationml/2006/main">
   <p:cSld>
     <p:spTree>
@@ -11700,7 +11785,7 @@
 </p:sld>
 </file>
 
-<file path=ppt/slides/slide12.xml><?xml version="1.0" encoding="utf-8"?>
+<file path=ppt/slides/slide13.xml><?xml version="1.0" encoding="utf-8"?>
 <p:sld xmlns:a="http://schemas.openxmlformats.org/drawingml/2006/main" xmlns:r="http://schemas.openxmlformats.org/officeDocument/2006/relationships" xmlns:p="http://schemas.openxmlformats.org/presentationml/2006/main">
   <p:cSld>
     <p:spTree>
@@ -11806,7 +11891,7 @@
 </p:sld>
 </file>
 
-<file path=ppt/slides/slide13.xml><?xml version="1.0" encoding="utf-8"?>
+<file path=ppt/slides/slide14.xml><?xml version="1.0" encoding="utf-8"?>
 <p:sld xmlns:a="http://schemas.openxmlformats.org/drawingml/2006/main" xmlns:r="http://schemas.openxmlformats.org/officeDocument/2006/relationships" xmlns:p="http://schemas.openxmlformats.org/presentationml/2006/main">
   <p:cSld>
     <p:spTree>
@@ -12170,7 +12255,7 @@
 </p:sld>
 </file>
 
-<file path=ppt/slides/slide14.xml><?xml version="1.0" encoding="utf-8"?>
+<file path=ppt/slides/slide15.xml><?xml version="1.0" encoding="utf-8"?>
 <p:sld xmlns:a="http://schemas.openxmlformats.org/drawingml/2006/main" xmlns:r="http://schemas.openxmlformats.org/officeDocument/2006/relationships" xmlns:p="http://schemas.openxmlformats.org/presentationml/2006/main">
   <p:cSld>
     <p:spTree>
@@ -12276,7 +12361,7 @@
 </p:sld>
 </file>
 
-<file path=ppt/slides/slide15.xml><?xml version="1.0" encoding="utf-8"?>
+<file path=ppt/slides/slide16.xml><?xml version="1.0" encoding="utf-8"?>
 <p:sld xmlns:a="http://schemas.openxmlformats.org/drawingml/2006/main" xmlns:r="http://schemas.openxmlformats.org/officeDocument/2006/relationships" xmlns:p="http://schemas.openxmlformats.org/presentationml/2006/main">
   <p:cSld>
     <p:spTree>
@@ -12377,7 +12462,7 @@
 </p:sld>
 </file>
 
-<file path=ppt/slides/slide16.xml><?xml version="1.0" encoding="utf-8"?>
+<file path=ppt/slides/slide17.xml><?xml version="1.0" encoding="utf-8"?>
 <p:sld xmlns:a="http://schemas.openxmlformats.org/drawingml/2006/main" xmlns:r="http://schemas.openxmlformats.org/officeDocument/2006/relationships" xmlns:p="http://schemas.openxmlformats.org/presentationml/2006/main">
   <p:cSld>
     <p:spTree>
@@ -12803,7 +12888,7 @@
 </p:sld>
 </file>
 
-<file path=ppt/slides/slide17.xml><?xml version="1.0" encoding="utf-8"?>
+<file path=ppt/slides/slide18.xml><?xml version="1.0" encoding="utf-8"?>
 <p:sld xmlns:a="http://schemas.openxmlformats.org/drawingml/2006/main" xmlns:r="http://schemas.openxmlformats.org/officeDocument/2006/relationships" xmlns:p="http://schemas.openxmlformats.org/presentationml/2006/main">
   <p:cSld>
     <p:spTree>
@@ -13017,7 +13102,7 @@
 </p:sld>
 </file>
 
-<file path=ppt/slides/slide18.xml><?xml version="1.0" encoding="utf-8"?>
+<file path=ppt/slides/slide19.xml><?xml version="1.0" encoding="utf-8"?>
 <p:sld xmlns:a="http://schemas.openxmlformats.org/drawingml/2006/main" xmlns:r="http://schemas.openxmlformats.org/officeDocument/2006/relationships" xmlns:p="http://schemas.openxmlformats.org/presentationml/2006/main">
   <p:cSld>
     <p:spTree>
@@ -13344,102 +13429,6 @@
     <p:extLst>
       <p:ext uri="{BB962C8B-B14F-4D97-AF65-F5344CB8AC3E}">
         <p14:creationId xmlns:p14="http://schemas.microsoft.com/office/powerpoint/2010/main" val="2176363826"/>
-      </p:ext>
-    </p:extLst>
-  </p:cSld>
-  <p:clrMapOvr>
-    <a:masterClrMapping/>
-  </p:clrMapOvr>
-</p:sld>
-</file>
-
-<file path=ppt/slides/slide19.xml><?xml version="1.0" encoding="utf-8"?>
-<p:sld xmlns:a="http://schemas.openxmlformats.org/drawingml/2006/main" xmlns:r="http://schemas.openxmlformats.org/officeDocument/2006/relationships" xmlns:p="http://schemas.openxmlformats.org/presentationml/2006/main">
-  <p:cSld>
-    <p:spTree>
-      <p:nvGrpSpPr>
-        <p:cNvPr id="1" name=""/>
-        <p:cNvGrpSpPr/>
-        <p:nvPr/>
-      </p:nvGrpSpPr>
-      <p:grpSpPr>
-        <a:xfrm>
-          <a:off x="0" y="0"/>
-          <a:ext cx="0" cy="0"/>
-          <a:chOff x="0" y="0"/>
-          <a:chExt cx="0" cy="0"/>
-        </a:xfrm>
-      </p:grpSpPr>
-      <p:sp>
-        <p:nvSpPr>
-          <p:cNvPr id="4" name="Title 3">
-            <a:extLst>
-              <a:ext uri="{FF2B5EF4-FFF2-40B4-BE49-F238E27FC236}">
-                <a16:creationId xmlns:a16="http://schemas.microsoft.com/office/drawing/2014/main" id="{3B6576B7-E3E3-41CF-9812-CB467A51C29B}"/>
-              </a:ext>
-            </a:extLst>
-          </p:cNvPr>
-          <p:cNvSpPr>
-            <a:spLocks noGrp="1"/>
-          </p:cNvSpPr>
-          <p:nvPr>
-            <p:ph type="ctrTitle"/>
-          </p:nvPr>
-        </p:nvSpPr>
-        <p:spPr/>
-        <p:txBody>
-          <a:bodyPr/>
-          <a:lstStyle/>
-          <a:p>
-            <a:r>
-              <a:rPr lang="en-US" dirty="0"/>
-              <a:t>Fin</a:t>
-            </a:r>
-            <a:endParaRPr lang="en-ID" dirty="0"/>
-          </a:p>
-        </p:txBody>
-      </p:sp>
-      <p:sp>
-        <p:nvSpPr>
-          <p:cNvPr id="5" name="Subtitle 4">
-            <a:extLst>
-              <a:ext uri="{FF2B5EF4-FFF2-40B4-BE49-F238E27FC236}">
-                <a16:creationId xmlns:a16="http://schemas.microsoft.com/office/drawing/2014/main" id="{44B3E6D2-5DBB-443D-9F43-F1636F089A19}"/>
-              </a:ext>
-            </a:extLst>
-          </p:cNvPr>
-          <p:cNvSpPr>
-            <a:spLocks noGrp="1"/>
-          </p:cNvSpPr>
-          <p:nvPr>
-            <p:ph type="subTitle" idx="1"/>
-          </p:nvPr>
-        </p:nvSpPr>
-        <p:spPr/>
-        <p:txBody>
-          <a:bodyPr/>
-          <a:lstStyle/>
-          <a:p>
-            <a:r>
-              <a:rPr lang="en-US" dirty="0"/>
-              <a:t>16 </a:t>
-            </a:r>
-            <a:r>
-              <a:rPr lang="en-US" dirty="0" err="1"/>
-              <a:t>Agustus</a:t>
-            </a:r>
-            <a:r>
-              <a:rPr lang="en-US" dirty="0"/>
-              <a:t> 2021</a:t>
-            </a:r>
-            <a:endParaRPr lang="en-ID" dirty="0"/>
-          </a:p>
-        </p:txBody>
-      </p:sp>
-    </p:spTree>
-    <p:extLst>
-      <p:ext uri="{BB962C8B-B14F-4D97-AF65-F5344CB8AC3E}">
-        <p14:creationId xmlns:p14="http://schemas.microsoft.com/office/powerpoint/2010/main" val="4156923643"/>
       </p:ext>
     </p:extLst>
   </p:cSld>
@@ -13543,6 +13532,102 @@
 </file>
 
 <file path=ppt/slides/slide20.xml><?xml version="1.0" encoding="utf-8"?>
+<p:sld xmlns:a="http://schemas.openxmlformats.org/drawingml/2006/main" xmlns:r="http://schemas.openxmlformats.org/officeDocument/2006/relationships" xmlns:p="http://schemas.openxmlformats.org/presentationml/2006/main">
+  <p:cSld>
+    <p:spTree>
+      <p:nvGrpSpPr>
+        <p:cNvPr id="1" name=""/>
+        <p:cNvGrpSpPr/>
+        <p:nvPr/>
+      </p:nvGrpSpPr>
+      <p:grpSpPr>
+        <a:xfrm>
+          <a:off x="0" y="0"/>
+          <a:ext cx="0" cy="0"/>
+          <a:chOff x="0" y="0"/>
+          <a:chExt cx="0" cy="0"/>
+        </a:xfrm>
+      </p:grpSpPr>
+      <p:sp>
+        <p:nvSpPr>
+          <p:cNvPr id="4" name="Title 3">
+            <a:extLst>
+              <a:ext uri="{FF2B5EF4-FFF2-40B4-BE49-F238E27FC236}">
+                <a16:creationId xmlns:a16="http://schemas.microsoft.com/office/drawing/2014/main" id="{3B6576B7-E3E3-41CF-9812-CB467A51C29B}"/>
+              </a:ext>
+            </a:extLst>
+          </p:cNvPr>
+          <p:cNvSpPr>
+            <a:spLocks noGrp="1"/>
+          </p:cNvSpPr>
+          <p:nvPr>
+            <p:ph type="ctrTitle"/>
+          </p:nvPr>
+        </p:nvSpPr>
+        <p:spPr/>
+        <p:txBody>
+          <a:bodyPr/>
+          <a:lstStyle/>
+          <a:p>
+            <a:r>
+              <a:rPr lang="en-US" dirty="0"/>
+              <a:t>Fin</a:t>
+            </a:r>
+            <a:endParaRPr lang="en-ID" dirty="0"/>
+          </a:p>
+        </p:txBody>
+      </p:sp>
+      <p:sp>
+        <p:nvSpPr>
+          <p:cNvPr id="5" name="Subtitle 4">
+            <a:extLst>
+              <a:ext uri="{FF2B5EF4-FFF2-40B4-BE49-F238E27FC236}">
+                <a16:creationId xmlns:a16="http://schemas.microsoft.com/office/drawing/2014/main" id="{44B3E6D2-5DBB-443D-9F43-F1636F089A19}"/>
+              </a:ext>
+            </a:extLst>
+          </p:cNvPr>
+          <p:cNvSpPr>
+            <a:spLocks noGrp="1"/>
+          </p:cNvSpPr>
+          <p:nvPr>
+            <p:ph type="subTitle" idx="1"/>
+          </p:nvPr>
+        </p:nvSpPr>
+        <p:spPr/>
+        <p:txBody>
+          <a:bodyPr/>
+          <a:lstStyle/>
+          <a:p>
+            <a:r>
+              <a:rPr lang="en-US" dirty="0"/>
+              <a:t>16 </a:t>
+            </a:r>
+            <a:r>
+              <a:rPr lang="en-US" dirty="0" err="1"/>
+              <a:t>Agustus</a:t>
+            </a:r>
+            <a:r>
+              <a:rPr lang="en-US" dirty="0"/>
+              <a:t> 2021</a:t>
+            </a:r>
+            <a:endParaRPr lang="en-ID" dirty="0"/>
+          </a:p>
+        </p:txBody>
+      </p:sp>
+    </p:spTree>
+    <p:extLst>
+      <p:ext uri="{BB962C8B-B14F-4D97-AF65-F5344CB8AC3E}">
+        <p14:creationId xmlns:p14="http://schemas.microsoft.com/office/powerpoint/2010/main" val="4156923643"/>
+      </p:ext>
+    </p:extLst>
+  </p:cSld>
+  <p:clrMapOvr>
+    <a:masterClrMapping/>
+  </p:clrMapOvr>
+</p:sld>
+</file>
+
+<file path=ppt/slides/slide21.xml><?xml version="1.0" encoding="utf-8"?>
 <p:sld xmlns:a="http://schemas.openxmlformats.org/drawingml/2006/main" xmlns:r="http://schemas.openxmlformats.org/officeDocument/2006/relationships" xmlns:p="http://schemas.openxmlformats.org/presentationml/2006/main">
   <p:cSld>
     <p:spTree>
@@ -19027,7 +19112,7 @@
 </p:sld>
 </file>
 
-<file path=ppt/slides/slide21.xml><?xml version="1.0" encoding="utf-8"?>
+<file path=ppt/slides/slide22.xml><?xml version="1.0" encoding="utf-8"?>
 <p:sld xmlns:a="http://schemas.openxmlformats.org/drawingml/2006/main" xmlns:r="http://schemas.openxmlformats.org/officeDocument/2006/relationships" xmlns:p="http://schemas.openxmlformats.org/presentationml/2006/main">
   <p:cSld>
     <p:spTree>
@@ -19153,7 +19238,7 @@
 </p:sld>
 </file>
 
-<file path=ppt/slides/slide22.xml><?xml version="1.0" encoding="utf-8"?>
+<file path=ppt/slides/slide23.xml><?xml version="1.0" encoding="utf-8"?>
 <p:sld xmlns:a="http://schemas.openxmlformats.org/drawingml/2006/main" xmlns:r="http://schemas.openxmlformats.org/officeDocument/2006/relationships" xmlns:p="http://schemas.openxmlformats.org/presentationml/2006/main">
   <p:cSld>
     <p:spTree>
@@ -19561,7 +19646,7 @@
 </p:sld>
 </file>
 
-<file path=ppt/slides/slide23.xml><?xml version="1.0" encoding="utf-8"?>
+<file path=ppt/slides/slide24.xml><?xml version="1.0" encoding="utf-8"?>
 <p:sld xmlns:a="http://schemas.openxmlformats.org/drawingml/2006/main" xmlns:r="http://schemas.openxmlformats.org/officeDocument/2006/relationships" xmlns:p="http://schemas.openxmlformats.org/presentationml/2006/main">
   <p:cSld>
     <p:spTree>
@@ -19911,7 +19996,7 @@
 </p:sld>
 </file>
 
-<file path=ppt/slides/slide24.xml><?xml version="1.0" encoding="utf-8"?>
+<file path=ppt/slides/slide25.xml><?xml version="1.0" encoding="utf-8"?>
 <p:sld xmlns:a="http://schemas.openxmlformats.org/drawingml/2006/main" xmlns:r="http://schemas.openxmlformats.org/officeDocument/2006/relationships" xmlns:p="http://schemas.openxmlformats.org/presentationml/2006/main">
   <p:cSld>
     <p:spTree>
@@ -20042,7 +20127,7 @@
 </p:sld>
 </file>
 
-<file path=ppt/slides/slide25.xml><?xml version="1.0" encoding="utf-8"?>
+<file path=ppt/slides/slide26.xml><?xml version="1.0" encoding="utf-8"?>
 <p:sld xmlns:a="http://schemas.openxmlformats.org/drawingml/2006/main" xmlns:r="http://schemas.openxmlformats.org/officeDocument/2006/relationships" xmlns:p="http://schemas.openxmlformats.org/presentationml/2006/main">
   <p:cSld>
     <p:spTree>
@@ -20620,7 +20705,7 @@
 </p:sld>
 </file>
 
-<file path=ppt/slides/slide26.xml><?xml version="1.0" encoding="utf-8"?>
+<file path=ppt/slides/slide27.xml><?xml version="1.0" encoding="utf-8"?>
 <p:sld xmlns:a="http://schemas.openxmlformats.org/drawingml/2006/main" xmlns:r="http://schemas.openxmlformats.org/officeDocument/2006/relationships" xmlns:p="http://schemas.openxmlformats.org/presentationml/2006/main">
   <p:cSld>
     <p:spTree>
@@ -20798,7 +20883,7 @@
 </p:sld>
 </file>
 
-<file path=ppt/slides/slide27.xml><?xml version="1.0" encoding="utf-8"?>
+<file path=ppt/slides/slide28.xml><?xml version="1.0" encoding="utf-8"?>
 <p:sld xmlns:a="http://schemas.openxmlformats.org/drawingml/2006/main" xmlns:r="http://schemas.openxmlformats.org/officeDocument/2006/relationships" xmlns:p="http://schemas.openxmlformats.org/presentationml/2006/main">
   <p:cSld>
     <p:spTree>
@@ -20992,7 +21077,7 @@
 </p:sld>
 </file>
 
-<file path=ppt/slides/slide28.xml><?xml version="1.0" encoding="utf-8"?>
+<file path=ppt/slides/slide29.xml><?xml version="1.0" encoding="utf-8"?>
 <p:sld xmlns:a="http://schemas.openxmlformats.org/drawingml/2006/main" xmlns:r="http://schemas.openxmlformats.org/officeDocument/2006/relationships" xmlns:p="http://schemas.openxmlformats.org/presentationml/2006/main">
   <p:cSld>
     <p:spTree>
@@ -21188,499 +21273,6 @@
     <p:extLst>
       <p:ext uri="{BB962C8B-B14F-4D97-AF65-F5344CB8AC3E}">
         <p14:creationId xmlns:p14="http://schemas.microsoft.com/office/powerpoint/2010/main" val="2838191559"/>
-      </p:ext>
-    </p:extLst>
-  </p:cSld>
-  <p:clrMapOvr>
-    <a:masterClrMapping/>
-  </p:clrMapOvr>
-</p:sld>
-</file>
-
-<file path=ppt/slides/slide29.xml><?xml version="1.0" encoding="utf-8"?>
-<p:sld xmlns:a="http://schemas.openxmlformats.org/drawingml/2006/main" xmlns:r="http://schemas.openxmlformats.org/officeDocument/2006/relationships" xmlns:p="http://schemas.openxmlformats.org/presentationml/2006/main">
-  <p:cSld>
-    <p:spTree>
-      <p:nvGrpSpPr>
-        <p:cNvPr id="1" name=""/>
-        <p:cNvGrpSpPr/>
-        <p:nvPr/>
-      </p:nvGrpSpPr>
-      <p:grpSpPr>
-        <a:xfrm>
-          <a:off x="0" y="0"/>
-          <a:ext cx="0" cy="0"/>
-          <a:chOff x="0" y="0"/>
-          <a:chExt cx="0" cy="0"/>
-        </a:xfrm>
-      </p:grpSpPr>
-      <p:sp>
-        <p:nvSpPr>
-          <p:cNvPr id="2" name="Title 1">
-            <a:extLst>
-              <a:ext uri="{FF2B5EF4-FFF2-40B4-BE49-F238E27FC236}">
-                <a16:creationId xmlns:a16="http://schemas.microsoft.com/office/drawing/2014/main" id="{842E64C4-7BEB-4649-990E-34A62681D889}"/>
-              </a:ext>
-            </a:extLst>
-          </p:cNvPr>
-          <p:cNvSpPr>
-            <a:spLocks noGrp="1"/>
-          </p:cNvSpPr>
-          <p:nvPr>
-            <p:ph type="title"/>
-          </p:nvPr>
-        </p:nvSpPr>
-        <p:spPr/>
-        <p:txBody>
-          <a:bodyPr/>
-          <a:lstStyle/>
-          <a:p>
-            <a:r>
-              <a:rPr lang="en-US" dirty="0" err="1"/>
-              <a:t>Landasan</a:t>
-            </a:r>
-            <a:r>
-              <a:rPr lang="en-US" dirty="0"/>
-              <a:t> </a:t>
-            </a:r>
-            <a:r>
-              <a:rPr lang="en-US" dirty="0" err="1"/>
-              <a:t>Teori</a:t>
-            </a:r>
-            <a:endParaRPr lang="en-ID" dirty="0"/>
-          </a:p>
-        </p:txBody>
-      </p:sp>
-      <p:sp>
-        <p:nvSpPr>
-          <p:cNvPr id="3" name="Content Placeholder 2">
-            <a:extLst>
-              <a:ext uri="{FF2B5EF4-FFF2-40B4-BE49-F238E27FC236}">
-                <a16:creationId xmlns:a16="http://schemas.microsoft.com/office/drawing/2014/main" id="{EA29F828-0573-4FE7-9C61-C33AB184DDD7}"/>
-              </a:ext>
-            </a:extLst>
-          </p:cNvPr>
-          <p:cNvSpPr>
-            <a:spLocks noGrp="1"/>
-          </p:cNvSpPr>
-          <p:nvPr>
-            <p:ph idx="1"/>
-          </p:nvPr>
-        </p:nvSpPr>
-        <p:spPr/>
-        <p:txBody>
-          <a:bodyPr>
-            <a:normAutofit fontScale="92500" lnSpcReduction="20000"/>
-          </a:bodyPr>
-          <a:lstStyle/>
-          <a:p>
-            <a:r>
-              <a:rPr lang="en-US" dirty="0" err="1"/>
-              <a:t>Pengenalan</a:t>
-            </a:r>
-            <a:r>
-              <a:rPr lang="en-US" dirty="0"/>
-              <a:t> </a:t>
-            </a:r>
-            <a:r>
-              <a:rPr lang="en-US" dirty="0" err="1"/>
-              <a:t>pola</a:t>
-            </a:r>
-            <a:r>
-              <a:rPr lang="en-US" dirty="0"/>
-              <a:t> </a:t>
-            </a:r>
-            <a:r>
-              <a:rPr lang="en-US" dirty="0" err="1"/>
-              <a:t>digunakan</a:t>
-            </a:r>
-            <a:r>
-              <a:rPr lang="en-US" dirty="0"/>
-              <a:t> pada </a:t>
-            </a:r>
-            <a:r>
-              <a:rPr lang="en-US" dirty="0" err="1"/>
-              <a:t>Biologi</a:t>
-            </a:r>
-            <a:r>
-              <a:rPr lang="en-US" dirty="0"/>
-              <a:t> </a:t>
-            </a:r>
-            <a:r>
-              <a:rPr lang="en-US" dirty="0" err="1"/>
-              <a:t>dapat</a:t>
-            </a:r>
-            <a:r>
-              <a:rPr lang="en-US" dirty="0"/>
-              <a:t> </a:t>
-            </a:r>
-            <a:r>
-              <a:rPr lang="en-US" dirty="0" err="1"/>
-              <a:t>ditemukan</a:t>
-            </a:r>
-            <a:r>
-              <a:rPr lang="en-US" dirty="0"/>
-              <a:t> pada </a:t>
-            </a:r>
-            <a:r>
-              <a:rPr lang="en-US" dirty="0" err="1"/>
-              <a:t>dua</a:t>
-            </a:r>
-            <a:r>
-              <a:rPr lang="en-US" dirty="0"/>
-              <a:t> area </a:t>
-            </a:r>
-            <a:r>
-              <a:rPr lang="en-US" dirty="0" err="1"/>
-              <a:t>berikut</a:t>
-            </a:r>
-            <a:r>
-              <a:rPr lang="en-US" dirty="0"/>
-              <a:t>.</a:t>
-            </a:r>
-          </a:p>
-          <a:p>
-            <a:pPr lvl="1"/>
-            <a:r>
-              <a:rPr lang="en-US" dirty="0"/>
-              <a:t>Genomics : </a:t>
-            </a:r>
-            <a:r>
-              <a:rPr lang="en-US" dirty="0" err="1"/>
-              <a:t>fokus</a:t>
-            </a:r>
-            <a:r>
-              <a:rPr lang="en-US" dirty="0"/>
-              <a:t> pada </a:t>
-            </a:r>
-            <a:r>
-              <a:rPr lang="en-US" dirty="0" err="1"/>
-              <a:t>kumpulan</a:t>
-            </a:r>
-            <a:r>
-              <a:rPr lang="en-US" dirty="0"/>
-              <a:t> gen yang </a:t>
-            </a:r>
-            <a:r>
-              <a:rPr lang="en-US" dirty="0" err="1"/>
-              <a:t>ada</a:t>
-            </a:r>
-            <a:r>
-              <a:rPr lang="en-US" dirty="0"/>
-              <a:t> pada sel.</a:t>
-            </a:r>
-          </a:p>
-          <a:p>
-            <a:pPr lvl="1"/>
-            <a:r>
-              <a:rPr lang="en-US" dirty="0"/>
-              <a:t>Proteomics : </a:t>
-            </a:r>
-            <a:r>
-              <a:rPr lang="en-US" dirty="0" err="1"/>
-              <a:t>fokus</a:t>
-            </a:r>
-            <a:r>
-              <a:rPr lang="en-US" dirty="0"/>
-              <a:t> pada </a:t>
-            </a:r>
-            <a:r>
-              <a:rPr lang="en-US" dirty="0" err="1"/>
-              <a:t>kumpulan</a:t>
-            </a:r>
-            <a:r>
-              <a:rPr lang="en-US" dirty="0"/>
-              <a:t> protein yang </a:t>
-            </a:r>
-            <a:r>
-              <a:rPr lang="en-US" dirty="0" err="1"/>
-              <a:t>diproduksi</a:t>
-            </a:r>
-            <a:r>
-              <a:rPr lang="en-US" dirty="0"/>
-              <a:t> oleh sel.</a:t>
-            </a:r>
-          </a:p>
-          <a:p>
-            <a:r>
-              <a:rPr lang="en-US" dirty="0"/>
-              <a:t>Tasks pada </a:t>
-            </a:r>
-            <a:r>
-              <a:rPr lang="en-US" dirty="0" err="1"/>
-              <a:t>Biologi</a:t>
-            </a:r>
-            <a:r>
-              <a:rPr lang="en-US" dirty="0"/>
-              <a:t> dan </a:t>
-            </a:r>
-            <a:r>
-              <a:rPr lang="en-US" dirty="0" err="1"/>
-              <a:t>alasannya</a:t>
-            </a:r>
-            <a:endParaRPr lang="en-US" dirty="0"/>
-          </a:p>
-          <a:p>
-            <a:pPr lvl="1"/>
-            <a:r>
-              <a:rPr lang="en-US" dirty="0"/>
-              <a:t>Genomics</a:t>
-            </a:r>
-          </a:p>
-          <a:p>
-            <a:pPr lvl="2"/>
-            <a:r>
-              <a:rPr lang="en-US" dirty="0"/>
-              <a:t>Sequence classification : </a:t>
-            </a:r>
-            <a:r>
-              <a:rPr lang="en-US" dirty="0" err="1"/>
-              <a:t>memprediksi</a:t>
-            </a:r>
-            <a:r>
-              <a:rPr lang="en-US" dirty="0"/>
-              <a:t> label </a:t>
-            </a:r>
-            <a:r>
-              <a:rPr lang="en-US" dirty="0" err="1"/>
-              <a:t>sebuah</a:t>
-            </a:r>
-            <a:r>
-              <a:rPr lang="en-US" dirty="0"/>
-              <a:t> </a:t>
-            </a:r>
-            <a:r>
-              <a:rPr lang="en-US" dirty="0" err="1"/>
-              <a:t>sekuens</a:t>
-            </a:r>
-            <a:r>
-              <a:rPr lang="en-US" dirty="0"/>
-              <a:t> </a:t>
-            </a:r>
-            <a:r>
-              <a:rPr lang="en-US" dirty="0" err="1"/>
-              <a:t>berdasarkan</a:t>
-            </a:r>
-            <a:r>
-              <a:rPr lang="en-US" dirty="0"/>
-              <a:t> </a:t>
-            </a:r>
-            <a:r>
-              <a:rPr lang="en-US" dirty="0" err="1"/>
-              <a:t>fitur</a:t>
-            </a:r>
-            <a:r>
-              <a:rPr lang="en-US" dirty="0"/>
-              <a:t> </a:t>
-            </a:r>
-            <a:r>
-              <a:rPr lang="en-US" dirty="0" err="1"/>
-              <a:t>tertentu</a:t>
-            </a:r>
-            <a:r>
-              <a:rPr lang="en-US" dirty="0"/>
-              <a:t>. i.e. </a:t>
-            </a:r>
-            <a:r>
-              <a:rPr lang="en-US" dirty="0" err="1"/>
-              <a:t>sekuens</a:t>
-            </a:r>
-            <a:r>
-              <a:rPr lang="en-US" dirty="0"/>
-              <a:t> DNA </a:t>
-            </a:r>
-            <a:r>
-              <a:rPr lang="en-US" dirty="0" err="1"/>
-              <a:t>manusia</a:t>
-            </a:r>
-            <a:endParaRPr lang="en-US" dirty="0"/>
-          </a:p>
-          <a:p>
-            <a:pPr lvl="2"/>
-            <a:r>
-              <a:rPr lang="en-US" dirty="0"/>
-              <a:t>Promoter prediction : </a:t>
-            </a:r>
-            <a:r>
-              <a:rPr lang="en-US" dirty="0" err="1"/>
-              <a:t>memprediksi</a:t>
-            </a:r>
-            <a:r>
-              <a:rPr lang="en-US" dirty="0"/>
-              <a:t> </a:t>
-            </a:r>
-            <a:r>
-              <a:rPr lang="en-US" dirty="0" err="1"/>
-              <a:t>apakah</a:t>
-            </a:r>
-            <a:r>
-              <a:rPr lang="en-US" dirty="0"/>
-              <a:t> </a:t>
-            </a:r>
-            <a:r>
-              <a:rPr lang="en-US" dirty="0" err="1"/>
-              <a:t>sebuah</a:t>
-            </a:r>
-            <a:r>
-              <a:rPr lang="en-US" dirty="0"/>
-              <a:t> </a:t>
-            </a:r>
-            <a:r>
-              <a:rPr lang="en-US" dirty="0" err="1"/>
-              <a:t>sekuens</a:t>
-            </a:r>
-            <a:r>
-              <a:rPr lang="en-US" dirty="0"/>
-              <a:t> </a:t>
-            </a:r>
-            <a:r>
-              <a:rPr lang="en-US" dirty="0" err="1"/>
-              <a:t>memiliki</a:t>
-            </a:r>
-            <a:r>
-              <a:rPr lang="en-US" dirty="0"/>
-              <a:t> promoter </a:t>
-            </a:r>
-            <a:r>
-              <a:rPr lang="en-US" dirty="0" err="1"/>
-              <a:t>atau</a:t>
-            </a:r>
-            <a:r>
-              <a:rPr lang="en-US" dirty="0"/>
-              <a:t> </a:t>
-            </a:r>
-            <a:r>
-              <a:rPr lang="en-US" dirty="0" err="1"/>
-              <a:t>tidak</a:t>
-            </a:r>
-            <a:r>
-              <a:rPr lang="en-US" dirty="0"/>
-              <a:t>. Jika </a:t>
-            </a:r>
-            <a:r>
-              <a:rPr lang="en-US" dirty="0" err="1"/>
-              <a:t>terdapat</a:t>
-            </a:r>
-            <a:r>
-              <a:rPr lang="en-US" dirty="0"/>
-              <a:t> promoter, </a:t>
-            </a:r>
-            <a:r>
-              <a:rPr lang="en-US" dirty="0" err="1"/>
-              <a:t>kemungkinan</a:t>
-            </a:r>
-            <a:r>
-              <a:rPr lang="en-US" dirty="0"/>
-              <a:t> </a:t>
-            </a:r>
-            <a:r>
-              <a:rPr lang="en-US" dirty="0" err="1"/>
-              <a:t>sekuens</a:t>
-            </a:r>
-            <a:r>
-              <a:rPr lang="en-US" dirty="0"/>
-              <a:t> </a:t>
-            </a:r>
-            <a:r>
-              <a:rPr lang="en-US" dirty="0" err="1"/>
-              <a:t>ini</a:t>
-            </a:r>
-            <a:r>
-              <a:rPr lang="en-US" dirty="0"/>
-              <a:t> </a:t>
-            </a:r>
-            <a:r>
-              <a:rPr lang="en-US" dirty="0" err="1"/>
-              <a:t>mengodekan</a:t>
-            </a:r>
-            <a:r>
-              <a:rPr lang="en-US" dirty="0"/>
-              <a:t> protein.</a:t>
-            </a:r>
-          </a:p>
-          <a:p>
-            <a:pPr lvl="2"/>
-            <a:r>
-              <a:rPr lang="en-US" dirty="0"/>
-              <a:t>Cancer prediction : </a:t>
-            </a:r>
-            <a:r>
-              <a:rPr lang="en-US" dirty="0" err="1"/>
-              <a:t>memprediksi</a:t>
-            </a:r>
-            <a:r>
-              <a:rPr lang="en-US" dirty="0"/>
-              <a:t> </a:t>
-            </a:r>
-            <a:r>
-              <a:rPr lang="en-US" dirty="0" err="1"/>
-              <a:t>jika</a:t>
-            </a:r>
-            <a:r>
-              <a:rPr lang="en-US" dirty="0"/>
-              <a:t> pada </a:t>
-            </a:r>
-            <a:r>
-              <a:rPr lang="en-US" dirty="0" err="1"/>
-              <a:t>sekuens</a:t>
-            </a:r>
-            <a:r>
-              <a:rPr lang="en-US" dirty="0"/>
-              <a:t> </a:t>
-            </a:r>
-            <a:r>
-              <a:rPr lang="en-US" dirty="0" err="1"/>
-              <a:t>terdapat</a:t>
-            </a:r>
-            <a:r>
-              <a:rPr lang="en-US" dirty="0"/>
-              <a:t> gen yang </a:t>
-            </a:r>
-            <a:r>
-              <a:rPr lang="en-US" dirty="0" err="1"/>
-              <a:t>dapat</a:t>
-            </a:r>
-            <a:r>
-              <a:rPr lang="en-US" dirty="0"/>
-              <a:t> </a:t>
-            </a:r>
-            <a:r>
-              <a:rPr lang="en-US" dirty="0" err="1"/>
-              <a:t>mengakibatkan</a:t>
-            </a:r>
-            <a:r>
-              <a:rPr lang="en-US" dirty="0"/>
-              <a:t> </a:t>
-            </a:r>
-            <a:r>
-              <a:rPr lang="en-US" dirty="0" err="1"/>
-              <a:t>kanker</a:t>
-            </a:r>
-            <a:r>
-              <a:rPr lang="en-US" dirty="0"/>
-              <a:t>.</a:t>
-            </a:r>
-          </a:p>
-          <a:p>
-            <a:pPr lvl="1"/>
-            <a:r>
-              <a:rPr lang="en-ID" dirty="0"/>
-              <a:t>Proteomics</a:t>
-            </a:r>
-          </a:p>
-          <a:p>
-            <a:pPr lvl="2"/>
-            <a:r>
-              <a:rPr lang="en-ID" dirty="0"/>
-              <a:t>Protein interaction :</a:t>
-            </a:r>
-          </a:p>
-        </p:txBody>
-      </p:sp>
-    </p:spTree>
-    <p:extLst>
-      <p:ext uri="{BB962C8B-B14F-4D97-AF65-F5344CB8AC3E}">
-        <p14:creationId xmlns:p14="http://schemas.microsoft.com/office/powerpoint/2010/main" val="2459153726"/>
       </p:ext>
     </p:extLst>
   </p:cSld>
@@ -21752,7 +21344,7 @@
             <p:ph idx="1"/>
             <p:extLst>
               <p:ext uri="{D42A27DB-BD31-4B8C-83A1-F6EECF244321}">
-                <p14:modId xmlns:p14="http://schemas.microsoft.com/office/powerpoint/2010/main" val="416437118"/>
+                <p14:modId xmlns:p14="http://schemas.microsoft.com/office/powerpoint/2010/main" val="1540361630"/>
               </p:ext>
             </p:extLst>
           </p:nvPr>
@@ -21840,7 +21432,7 @@
                     <a:p>
                       <a:r>
                         <a:rPr lang="en-US" dirty="0"/>
-                        <a:t>Predict the class of given protein sequence i.e. membrane-bound or water soluble, subcellular location, disorder prediction</a:t>
+                        <a:t>Predict the class of given protein sequence i.e. membrane-bound or water soluble, subcellular location, disorder prediction.</a:t>
                       </a:r>
                       <a:endParaRPr lang="en-ID" dirty="0"/>
                     </a:p>
@@ -21873,6 +21465,10 @@
                     <a:bodyPr/>
                     <a:lstStyle/>
                     <a:p>
+                      <a:r>
+                        <a:rPr lang="en-US" dirty="0"/>
+                        <a:t>Predict the class of given nucleotide sequence i.e. human gene or mouse gene, coding gene or non-coding gene.</a:t>
+                      </a:r>
                       <a:endParaRPr lang="en-ID" dirty="0"/>
                     </a:p>
                   </a:txBody>
@@ -21890,7 +21486,11 @@
                     <a:bodyPr/>
                     <a:lstStyle/>
                     <a:p>
-                      <a:endParaRPr lang="en-ID"/>
+                      <a:r>
+                        <a:rPr lang="en-US" dirty="0"/>
+                        <a:t>Structure Prediction</a:t>
+                      </a:r>
+                      <a:endParaRPr lang="en-ID" dirty="0"/>
                     </a:p>
                   </a:txBody>
                   <a:tcPr/>
@@ -21900,7 +21500,11 @@
                     <a:bodyPr/>
                     <a:lstStyle/>
                     <a:p>
-                      <a:endParaRPr lang="en-ID"/>
+                      <a:r>
+                        <a:rPr lang="en-US" dirty="0"/>
+                        <a:t>Predict the structure of certain protein.</a:t>
+                      </a:r>
+                      <a:endParaRPr lang="en-ID" dirty="0"/>
                     </a:p>
                   </a:txBody>
                   <a:tcPr/>
@@ -21955,6 +21559,499 @@
 </p:sld>
 </file>
 
+<file path=ppt/slides/slide30.xml><?xml version="1.0" encoding="utf-8"?>
+<p:sld xmlns:a="http://schemas.openxmlformats.org/drawingml/2006/main" xmlns:r="http://schemas.openxmlformats.org/officeDocument/2006/relationships" xmlns:p="http://schemas.openxmlformats.org/presentationml/2006/main">
+  <p:cSld>
+    <p:spTree>
+      <p:nvGrpSpPr>
+        <p:cNvPr id="1" name=""/>
+        <p:cNvGrpSpPr/>
+        <p:nvPr/>
+      </p:nvGrpSpPr>
+      <p:grpSpPr>
+        <a:xfrm>
+          <a:off x="0" y="0"/>
+          <a:ext cx="0" cy="0"/>
+          <a:chOff x="0" y="0"/>
+          <a:chExt cx="0" cy="0"/>
+        </a:xfrm>
+      </p:grpSpPr>
+      <p:sp>
+        <p:nvSpPr>
+          <p:cNvPr id="2" name="Title 1">
+            <a:extLst>
+              <a:ext uri="{FF2B5EF4-FFF2-40B4-BE49-F238E27FC236}">
+                <a16:creationId xmlns:a16="http://schemas.microsoft.com/office/drawing/2014/main" id="{842E64C4-7BEB-4649-990E-34A62681D889}"/>
+              </a:ext>
+            </a:extLst>
+          </p:cNvPr>
+          <p:cNvSpPr>
+            <a:spLocks noGrp="1"/>
+          </p:cNvSpPr>
+          <p:nvPr>
+            <p:ph type="title"/>
+          </p:nvPr>
+        </p:nvSpPr>
+        <p:spPr/>
+        <p:txBody>
+          <a:bodyPr/>
+          <a:lstStyle/>
+          <a:p>
+            <a:r>
+              <a:rPr lang="en-US" dirty="0" err="1"/>
+              <a:t>Landasan</a:t>
+            </a:r>
+            <a:r>
+              <a:rPr lang="en-US" dirty="0"/>
+              <a:t> </a:t>
+            </a:r>
+            <a:r>
+              <a:rPr lang="en-US" dirty="0" err="1"/>
+              <a:t>Teori</a:t>
+            </a:r>
+            <a:endParaRPr lang="en-ID" dirty="0"/>
+          </a:p>
+        </p:txBody>
+      </p:sp>
+      <p:sp>
+        <p:nvSpPr>
+          <p:cNvPr id="3" name="Content Placeholder 2">
+            <a:extLst>
+              <a:ext uri="{FF2B5EF4-FFF2-40B4-BE49-F238E27FC236}">
+                <a16:creationId xmlns:a16="http://schemas.microsoft.com/office/drawing/2014/main" id="{EA29F828-0573-4FE7-9C61-C33AB184DDD7}"/>
+              </a:ext>
+            </a:extLst>
+          </p:cNvPr>
+          <p:cNvSpPr>
+            <a:spLocks noGrp="1"/>
+          </p:cNvSpPr>
+          <p:nvPr>
+            <p:ph idx="1"/>
+          </p:nvPr>
+        </p:nvSpPr>
+        <p:spPr/>
+        <p:txBody>
+          <a:bodyPr>
+            <a:normAutofit fontScale="92500" lnSpcReduction="20000"/>
+          </a:bodyPr>
+          <a:lstStyle/>
+          <a:p>
+            <a:r>
+              <a:rPr lang="en-US" dirty="0" err="1"/>
+              <a:t>Pengenalan</a:t>
+            </a:r>
+            <a:r>
+              <a:rPr lang="en-US" dirty="0"/>
+              <a:t> </a:t>
+            </a:r>
+            <a:r>
+              <a:rPr lang="en-US" dirty="0" err="1"/>
+              <a:t>pola</a:t>
+            </a:r>
+            <a:r>
+              <a:rPr lang="en-US" dirty="0"/>
+              <a:t> </a:t>
+            </a:r>
+            <a:r>
+              <a:rPr lang="en-US" dirty="0" err="1"/>
+              <a:t>digunakan</a:t>
+            </a:r>
+            <a:r>
+              <a:rPr lang="en-US" dirty="0"/>
+              <a:t> pada </a:t>
+            </a:r>
+            <a:r>
+              <a:rPr lang="en-US" dirty="0" err="1"/>
+              <a:t>Biologi</a:t>
+            </a:r>
+            <a:r>
+              <a:rPr lang="en-US" dirty="0"/>
+              <a:t> </a:t>
+            </a:r>
+            <a:r>
+              <a:rPr lang="en-US" dirty="0" err="1"/>
+              <a:t>dapat</a:t>
+            </a:r>
+            <a:r>
+              <a:rPr lang="en-US" dirty="0"/>
+              <a:t> </a:t>
+            </a:r>
+            <a:r>
+              <a:rPr lang="en-US" dirty="0" err="1"/>
+              <a:t>ditemukan</a:t>
+            </a:r>
+            <a:r>
+              <a:rPr lang="en-US" dirty="0"/>
+              <a:t> pada </a:t>
+            </a:r>
+            <a:r>
+              <a:rPr lang="en-US" dirty="0" err="1"/>
+              <a:t>dua</a:t>
+            </a:r>
+            <a:r>
+              <a:rPr lang="en-US" dirty="0"/>
+              <a:t> area </a:t>
+            </a:r>
+            <a:r>
+              <a:rPr lang="en-US" dirty="0" err="1"/>
+              <a:t>berikut</a:t>
+            </a:r>
+            <a:r>
+              <a:rPr lang="en-US" dirty="0"/>
+              <a:t>.</a:t>
+            </a:r>
+          </a:p>
+          <a:p>
+            <a:pPr lvl="1"/>
+            <a:r>
+              <a:rPr lang="en-US" dirty="0"/>
+              <a:t>Genomics : </a:t>
+            </a:r>
+            <a:r>
+              <a:rPr lang="en-US" dirty="0" err="1"/>
+              <a:t>fokus</a:t>
+            </a:r>
+            <a:r>
+              <a:rPr lang="en-US" dirty="0"/>
+              <a:t> pada </a:t>
+            </a:r>
+            <a:r>
+              <a:rPr lang="en-US" dirty="0" err="1"/>
+              <a:t>kumpulan</a:t>
+            </a:r>
+            <a:r>
+              <a:rPr lang="en-US" dirty="0"/>
+              <a:t> gen yang </a:t>
+            </a:r>
+            <a:r>
+              <a:rPr lang="en-US" dirty="0" err="1"/>
+              <a:t>ada</a:t>
+            </a:r>
+            <a:r>
+              <a:rPr lang="en-US" dirty="0"/>
+              <a:t> pada sel.</a:t>
+            </a:r>
+          </a:p>
+          <a:p>
+            <a:pPr lvl="1"/>
+            <a:r>
+              <a:rPr lang="en-US" dirty="0"/>
+              <a:t>Proteomics : </a:t>
+            </a:r>
+            <a:r>
+              <a:rPr lang="en-US" dirty="0" err="1"/>
+              <a:t>fokus</a:t>
+            </a:r>
+            <a:r>
+              <a:rPr lang="en-US" dirty="0"/>
+              <a:t> pada </a:t>
+            </a:r>
+            <a:r>
+              <a:rPr lang="en-US" dirty="0" err="1"/>
+              <a:t>kumpulan</a:t>
+            </a:r>
+            <a:r>
+              <a:rPr lang="en-US" dirty="0"/>
+              <a:t> protein yang </a:t>
+            </a:r>
+            <a:r>
+              <a:rPr lang="en-US" dirty="0" err="1"/>
+              <a:t>diproduksi</a:t>
+            </a:r>
+            <a:r>
+              <a:rPr lang="en-US" dirty="0"/>
+              <a:t> oleh sel.</a:t>
+            </a:r>
+          </a:p>
+          <a:p>
+            <a:r>
+              <a:rPr lang="en-US" dirty="0"/>
+              <a:t>Tasks pada </a:t>
+            </a:r>
+            <a:r>
+              <a:rPr lang="en-US" dirty="0" err="1"/>
+              <a:t>Biologi</a:t>
+            </a:r>
+            <a:r>
+              <a:rPr lang="en-US" dirty="0"/>
+              <a:t> dan </a:t>
+            </a:r>
+            <a:r>
+              <a:rPr lang="en-US" dirty="0" err="1"/>
+              <a:t>alasannya</a:t>
+            </a:r>
+            <a:endParaRPr lang="en-US" dirty="0"/>
+          </a:p>
+          <a:p>
+            <a:pPr lvl="1"/>
+            <a:r>
+              <a:rPr lang="en-US" dirty="0"/>
+              <a:t>Genomics</a:t>
+            </a:r>
+          </a:p>
+          <a:p>
+            <a:pPr lvl="2"/>
+            <a:r>
+              <a:rPr lang="en-US" dirty="0"/>
+              <a:t>Sequence classification : </a:t>
+            </a:r>
+            <a:r>
+              <a:rPr lang="en-US" dirty="0" err="1"/>
+              <a:t>memprediksi</a:t>
+            </a:r>
+            <a:r>
+              <a:rPr lang="en-US" dirty="0"/>
+              <a:t> label </a:t>
+            </a:r>
+            <a:r>
+              <a:rPr lang="en-US" dirty="0" err="1"/>
+              <a:t>sebuah</a:t>
+            </a:r>
+            <a:r>
+              <a:rPr lang="en-US" dirty="0"/>
+              <a:t> </a:t>
+            </a:r>
+            <a:r>
+              <a:rPr lang="en-US" dirty="0" err="1"/>
+              <a:t>sekuens</a:t>
+            </a:r>
+            <a:r>
+              <a:rPr lang="en-US" dirty="0"/>
+              <a:t> </a:t>
+            </a:r>
+            <a:r>
+              <a:rPr lang="en-US" dirty="0" err="1"/>
+              <a:t>berdasarkan</a:t>
+            </a:r>
+            <a:r>
+              <a:rPr lang="en-US" dirty="0"/>
+              <a:t> </a:t>
+            </a:r>
+            <a:r>
+              <a:rPr lang="en-US" dirty="0" err="1"/>
+              <a:t>fitur</a:t>
+            </a:r>
+            <a:r>
+              <a:rPr lang="en-US" dirty="0"/>
+              <a:t> </a:t>
+            </a:r>
+            <a:r>
+              <a:rPr lang="en-US" dirty="0" err="1"/>
+              <a:t>tertentu</a:t>
+            </a:r>
+            <a:r>
+              <a:rPr lang="en-US" dirty="0"/>
+              <a:t>. i.e. </a:t>
+            </a:r>
+            <a:r>
+              <a:rPr lang="en-US" dirty="0" err="1"/>
+              <a:t>sekuens</a:t>
+            </a:r>
+            <a:r>
+              <a:rPr lang="en-US" dirty="0"/>
+              <a:t> DNA </a:t>
+            </a:r>
+            <a:r>
+              <a:rPr lang="en-US" dirty="0" err="1"/>
+              <a:t>manusia</a:t>
+            </a:r>
+            <a:endParaRPr lang="en-US" dirty="0"/>
+          </a:p>
+          <a:p>
+            <a:pPr lvl="2"/>
+            <a:r>
+              <a:rPr lang="en-US" dirty="0"/>
+              <a:t>Promoter prediction : </a:t>
+            </a:r>
+            <a:r>
+              <a:rPr lang="en-US" dirty="0" err="1"/>
+              <a:t>memprediksi</a:t>
+            </a:r>
+            <a:r>
+              <a:rPr lang="en-US" dirty="0"/>
+              <a:t> </a:t>
+            </a:r>
+            <a:r>
+              <a:rPr lang="en-US" dirty="0" err="1"/>
+              <a:t>apakah</a:t>
+            </a:r>
+            <a:r>
+              <a:rPr lang="en-US" dirty="0"/>
+              <a:t> </a:t>
+            </a:r>
+            <a:r>
+              <a:rPr lang="en-US" dirty="0" err="1"/>
+              <a:t>sebuah</a:t>
+            </a:r>
+            <a:r>
+              <a:rPr lang="en-US" dirty="0"/>
+              <a:t> </a:t>
+            </a:r>
+            <a:r>
+              <a:rPr lang="en-US" dirty="0" err="1"/>
+              <a:t>sekuens</a:t>
+            </a:r>
+            <a:r>
+              <a:rPr lang="en-US" dirty="0"/>
+              <a:t> </a:t>
+            </a:r>
+            <a:r>
+              <a:rPr lang="en-US" dirty="0" err="1"/>
+              <a:t>memiliki</a:t>
+            </a:r>
+            <a:r>
+              <a:rPr lang="en-US" dirty="0"/>
+              <a:t> promoter </a:t>
+            </a:r>
+            <a:r>
+              <a:rPr lang="en-US" dirty="0" err="1"/>
+              <a:t>atau</a:t>
+            </a:r>
+            <a:r>
+              <a:rPr lang="en-US" dirty="0"/>
+              <a:t> </a:t>
+            </a:r>
+            <a:r>
+              <a:rPr lang="en-US" dirty="0" err="1"/>
+              <a:t>tidak</a:t>
+            </a:r>
+            <a:r>
+              <a:rPr lang="en-US" dirty="0"/>
+              <a:t>. Jika </a:t>
+            </a:r>
+            <a:r>
+              <a:rPr lang="en-US" dirty="0" err="1"/>
+              <a:t>terdapat</a:t>
+            </a:r>
+            <a:r>
+              <a:rPr lang="en-US" dirty="0"/>
+              <a:t> promoter, </a:t>
+            </a:r>
+            <a:r>
+              <a:rPr lang="en-US" dirty="0" err="1"/>
+              <a:t>kemungkinan</a:t>
+            </a:r>
+            <a:r>
+              <a:rPr lang="en-US" dirty="0"/>
+              <a:t> </a:t>
+            </a:r>
+            <a:r>
+              <a:rPr lang="en-US" dirty="0" err="1"/>
+              <a:t>sekuens</a:t>
+            </a:r>
+            <a:r>
+              <a:rPr lang="en-US" dirty="0"/>
+              <a:t> </a:t>
+            </a:r>
+            <a:r>
+              <a:rPr lang="en-US" dirty="0" err="1"/>
+              <a:t>ini</a:t>
+            </a:r>
+            <a:r>
+              <a:rPr lang="en-US" dirty="0"/>
+              <a:t> </a:t>
+            </a:r>
+            <a:r>
+              <a:rPr lang="en-US" dirty="0" err="1"/>
+              <a:t>mengodekan</a:t>
+            </a:r>
+            <a:r>
+              <a:rPr lang="en-US" dirty="0"/>
+              <a:t> protein.</a:t>
+            </a:r>
+          </a:p>
+          <a:p>
+            <a:pPr lvl="2"/>
+            <a:r>
+              <a:rPr lang="en-US" dirty="0"/>
+              <a:t>Cancer prediction : </a:t>
+            </a:r>
+            <a:r>
+              <a:rPr lang="en-US" dirty="0" err="1"/>
+              <a:t>memprediksi</a:t>
+            </a:r>
+            <a:r>
+              <a:rPr lang="en-US" dirty="0"/>
+              <a:t> </a:t>
+            </a:r>
+            <a:r>
+              <a:rPr lang="en-US" dirty="0" err="1"/>
+              <a:t>jika</a:t>
+            </a:r>
+            <a:r>
+              <a:rPr lang="en-US" dirty="0"/>
+              <a:t> pada </a:t>
+            </a:r>
+            <a:r>
+              <a:rPr lang="en-US" dirty="0" err="1"/>
+              <a:t>sekuens</a:t>
+            </a:r>
+            <a:r>
+              <a:rPr lang="en-US" dirty="0"/>
+              <a:t> </a:t>
+            </a:r>
+            <a:r>
+              <a:rPr lang="en-US" dirty="0" err="1"/>
+              <a:t>terdapat</a:t>
+            </a:r>
+            <a:r>
+              <a:rPr lang="en-US" dirty="0"/>
+              <a:t> gen yang </a:t>
+            </a:r>
+            <a:r>
+              <a:rPr lang="en-US" dirty="0" err="1"/>
+              <a:t>dapat</a:t>
+            </a:r>
+            <a:r>
+              <a:rPr lang="en-US" dirty="0"/>
+              <a:t> </a:t>
+            </a:r>
+            <a:r>
+              <a:rPr lang="en-US" dirty="0" err="1"/>
+              <a:t>mengakibatkan</a:t>
+            </a:r>
+            <a:r>
+              <a:rPr lang="en-US" dirty="0"/>
+              <a:t> </a:t>
+            </a:r>
+            <a:r>
+              <a:rPr lang="en-US" dirty="0" err="1"/>
+              <a:t>kanker</a:t>
+            </a:r>
+            <a:r>
+              <a:rPr lang="en-US" dirty="0"/>
+              <a:t>.</a:t>
+            </a:r>
+          </a:p>
+          <a:p>
+            <a:pPr lvl="1"/>
+            <a:r>
+              <a:rPr lang="en-ID" dirty="0"/>
+              <a:t>Proteomics</a:t>
+            </a:r>
+          </a:p>
+          <a:p>
+            <a:pPr lvl="2"/>
+            <a:r>
+              <a:rPr lang="en-ID" dirty="0"/>
+              <a:t>Protein interaction :</a:t>
+            </a:r>
+          </a:p>
+        </p:txBody>
+      </p:sp>
+    </p:spTree>
+    <p:extLst>
+      <p:ext uri="{BB962C8B-B14F-4D97-AF65-F5344CB8AC3E}">
+        <p14:creationId xmlns:p14="http://schemas.microsoft.com/office/powerpoint/2010/main" val="2459153726"/>
+      </p:ext>
+    </p:extLst>
+  </p:cSld>
+  <p:clrMapOvr>
+    <a:masterClrMapping/>
+  </p:clrMapOvr>
+</p:sld>
+</file>
+
 <file path=ppt/slides/slide4.xml><?xml version="1.0" encoding="utf-8"?>
 <p:sld xmlns:a="http://schemas.openxmlformats.org/drawingml/2006/main" xmlns:r="http://schemas.openxmlformats.org/officeDocument/2006/relationships" xmlns:p="http://schemas.openxmlformats.org/presentationml/2006/main">
   <p:cSld>
@@ -22017,14 +22114,14 @@
             <p:ph idx="1"/>
             <p:extLst>
               <p:ext uri="{D42A27DB-BD31-4B8C-83A1-F6EECF244321}">
-                <p14:modId xmlns:p14="http://schemas.microsoft.com/office/powerpoint/2010/main" val="2960741959"/>
+                <p14:modId xmlns:p14="http://schemas.microsoft.com/office/powerpoint/2010/main" val="1986053568"/>
               </p:ext>
             </p:extLst>
           </p:nvPr>
         </p:nvGraphicFramePr>
         <p:xfrm>
           <a:off x="347382" y="1265555"/>
-          <a:ext cx="11497235" cy="4683760"/>
+          <a:ext cx="11497235" cy="5323840"/>
         </p:xfrm>
         <a:graphic>
           <a:graphicData uri="http://schemas.openxmlformats.org/drawingml/2006/table">
@@ -22290,6 +22387,80 @@
                     <a:lstStyle/>
                     <a:p>
                       <a:r>
+                        <a:rPr lang="en-ID" b="1" dirty="0" err="1"/>
+                        <a:t>UDSMProt</a:t>
+                      </a:r>
+                      <a:r>
+                        <a:rPr lang="en-ID" b="1" dirty="0"/>
+                        <a:t> (</a:t>
+                      </a:r>
+                      <a:r>
+                        <a:rPr lang="en-ID" b="1" dirty="0" err="1"/>
+                        <a:t>Strodthoff</a:t>
+                      </a:r>
+                      <a:r>
+                        <a:rPr lang="en-ID" b="1" dirty="0"/>
+                        <a:t> et. al., 2020)</a:t>
+                      </a:r>
+                    </a:p>
+                  </a:txBody>
+                  <a:tcPr/>
+                </a:tc>
+                <a:tc>
+                  <a:txBody>
+                    <a:bodyPr/>
+                    <a:lstStyle/>
+                    <a:p>
+                      <a:r>
+                        <a:rPr lang="en-US" b="1" dirty="0"/>
+                        <a:t>LSTM</a:t>
+                      </a:r>
+                      <a:endParaRPr lang="en-ID" b="1" dirty="0"/>
+                    </a:p>
+                  </a:txBody>
+                  <a:tcPr/>
+                </a:tc>
+                <a:tc>
+                  <a:txBody>
+                    <a:bodyPr/>
+                    <a:lstStyle/>
+                    <a:p>
+                      <a:r>
+                        <a:rPr lang="en-US" dirty="0"/>
+                        <a:t>Protein</a:t>
+                      </a:r>
+                      <a:endParaRPr lang="en-ID" dirty="0"/>
+                    </a:p>
+                  </a:txBody>
+                  <a:tcPr/>
+                </a:tc>
+                <a:tc>
+                  <a:txBody>
+                    <a:bodyPr/>
+                    <a:lstStyle/>
+                    <a:p>
+                      <a:r>
+                        <a:rPr lang="en-US" dirty="0"/>
+                        <a:t>Enzyme class prediction, gene ontology, homology, folding prediction</a:t>
+                      </a:r>
+                      <a:endParaRPr lang="en-ID" dirty="0"/>
+                    </a:p>
+                  </a:txBody>
+                  <a:tcPr/>
+                </a:tc>
+                <a:extLst>
+                  <a:ext uri="{0D108BD9-81ED-4DB2-BD59-A6C34878D82A}">
+                    <a16:rowId xmlns:a16="http://schemas.microsoft.com/office/drawing/2014/main" val="3312620072"/>
+                  </a:ext>
+                </a:extLst>
+              </a:tr>
+              <a:tr h="370840">
+                <a:tc>
+                  <a:txBody>
+                    <a:bodyPr/>
+                    <a:lstStyle/>
+                    <a:p>
+                      <a:r>
                         <a:rPr lang="en-US" dirty="0" err="1"/>
                         <a:t>SeqVec</a:t>
                       </a:r>
@@ -22365,22 +22536,22 @@
                     <a:lstStyle/>
                     <a:p>
                       <a:r>
-                        <a:rPr lang="en-US" dirty="0" err="1"/>
+                        <a:rPr lang="en-US" b="1" dirty="0" err="1"/>
                         <a:t>ProtBERT</a:t>
                       </a:r>
                       <a:r>
-                        <a:rPr lang="en-US" dirty="0"/>
+                        <a:rPr lang="en-US" b="1" dirty="0"/>
                         <a:t> (</a:t>
                       </a:r>
                       <a:r>
-                        <a:rPr lang="en-US" dirty="0" err="1"/>
+                        <a:rPr lang="en-US" b="1" dirty="0" err="1"/>
                         <a:t>Elnaggar</a:t>
                       </a:r>
                       <a:r>
-                        <a:rPr lang="en-US" dirty="0"/>
+                        <a:rPr lang="en-US" b="1" dirty="0"/>
                         <a:t> et. al., 2021)</a:t>
                       </a:r>
-                      <a:endParaRPr lang="en-ID" dirty="0"/>
+                      <a:endParaRPr lang="en-ID" b="1" dirty="0"/>
                     </a:p>
                   </a:txBody>
                   <a:tcPr/>
@@ -22724,6 +22895,104 @@
           <p:cNvPr id="2" name="Title 1">
             <a:extLst>
               <a:ext uri="{FF2B5EF4-FFF2-40B4-BE49-F238E27FC236}">
+                <a16:creationId xmlns:a16="http://schemas.microsoft.com/office/drawing/2014/main" id="{AC3EB2ED-5008-4695-85AC-52A06A1774D2}"/>
+              </a:ext>
+            </a:extLst>
+          </p:cNvPr>
+          <p:cNvSpPr>
+            <a:spLocks noGrp="1"/>
+          </p:cNvSpPr>
+          <p:nvPr>
+            <p:ph type="title"/>
+          </p:nvPr>
+        </p:nvSpPr>
+        <p:spPr/>
+        <p:txBody>
+          <a:bodyPr/>
+          <a:lstStyle/>
+          <a:p>
+            <a:r>
+              <a:rPr lang="en-US" dirty="0" err="1"/>
+              <a:t>UDSMProt</a:t>
+            </a:r>
+            <a:endParaRPr lang="en-ID" dirty="0"/>
+          </a:p>
+        </p:txBody>
+      </p:sp>
+      <p:sp>
+        <p:nvSpPr>
+          <p:cNvPr id="3" name="Content Placeholder 2">
+            <a:extLst>
+              <a:ext uri="{FF2B5EF4-FFF2-40B4-BE49-F238E27FC236}">
+                <a16:creationId xmlns:a16="http://schemas.microsoft.com/office/drawing/2014/main" id="{97AE2AB9-8179-4C7A-998F-8D2B9B72D5FC}"/>
+              </a:ext>
+            </a:extLst>
+          </p:cNvPr>
+          <p:cNvSpPr>
+            <a:spLocks noGrp="1"/>
+          </p:cNvSpPr>
+          <p:nvPr>
+            <p:ph idx="1"/>
+          </p:nvPr>
+        </p:nvSpPr>
+        <p:spPr/>
+        <p:txBody>
+          <a:bodyPr/>
+          <a:lstStyle/>
+          <a:p>
+            <a:r>
+              <a:rPr lang="en-US" dirty="0"/>
+              <a:t>Pre-trained with Swiss-</a:t>
+            </a:r>
+            <a:r>
+              <a:rPr lang="en-US" dirty="0" err="1"/>
+              <a:t>Prot</a:t>
+            </a:r>
+            <a:r>
+              <a:rPr lang="en-US" dirty="0"/>
+              <a:t> database</a:t>
+            </a:r>
+          </a:p>
+          <a:p>
+            <a:endParaRPr lang="en-ID" dirty="0"/>
+          </a:p>
+        </p:txBody>
+      </p:sp>
+    </p:spTree>
+    <p:extLst>
+      <p:ext uri="{BB962C8B-B14F-4D97-AF65-F5344CB8AC3E}">
+        <p14:creationId xmlns:p14="http://schemas.microsoft.com/office/powerpoint/2010/main" val="2003898266"/>
+      </p:ext>
+    </p:extLst>
+  </p:cSld>
+  <p:clrMapOvr>
+    <a:masterClrMapping/>
+  </p:clrMapOvr>
+</p:sld>
+</file>
+
+<file path=ppt/slides/slide6.xml><?xml version="1.0" encoding="utf-8"?>
+<p:sld xmlns:a="http://schemas.openxmlformats.org/drawingml/2006/main" xmlns:r="http://schemas.openxmlformats.org/officeDocument/2006/relationships" xmlns:p="http://schemas.openxmlformats.org/presentationml/2006/main">
+  <p:cSld>
+    <p:spTree>
+      <p:nvGrpSpPr>
+        <p:cNvPr id="1" name=""/>
+        <p:cNvGrpSpPr/>
+        <p:nvPr/>
+      </p:nvGrpSpPr>
+      <p:grpSpPr>
+        <a:xfrm>
+          <a:off x="0" y="0"/>
+          <a:ext cx="0" cy="0"/>
+          <a:chOff x="0" y="0"/>
+          <a:chExt cx="0" cy="0"/>
+        </a:xfrm>
+      </p:grpSpPr>
+      <p:sp>
+        <p:nvSpPr>
+          <p:cNvPr id="2" name="Title 1">
+            <a:extLst>
+              <a:ext uri="{FF2B5EF4-FFF2-40B4-BE49-F238E27FC236}">
                 <a16:creationId xmlns:a16="http://schemas.microsoft.com/office/drawing/2014/main" id="{331E463E-07DF-440C-883D-046524B10678}"/>
               </a:ext>
             </a:extLst>
@@ -22902,7 +23171,7 @@
 </p:sld>
 </file>
 
-<file path=ppt/slides/slide6.xml><?xml version="1.0" encoding="utf-8"?>
+<file path=ppt/slides/slide7.xml><?xml version="1.0" encoding="utf-8"?>
 <p:sld xmlns:a="http://schemas.openxmlformats.org/drawingml/2006/main" xmlns:r="http://schemas.openxmlformats.org/officeDocument/2006/relationships" xmlns:p="http://schemas.openxmlformats.org/presentationml/2006/main">
   <p:cSld>
     <p:spTree>
@@ -22991,7 +23260,7 @@
 </p:sld>
 </file>
 
-<file path=ppt/slides/slide7.xml><?xml version="1.0" encoding="utf-8"?>
+<file path=ppt/slides/slide8.xml><?xml version="1.0" encoding="utf-8"?>
 <p:sld xmlns:a="http://schemas.openxmlformats.org/drawingml/2006/main" xmlns:r="http://schemas.openxmlformats.org/officeDocument/2006/relationships" xmlns:p="http://schemas.openxmlformats.org/presentationml/2006/main">
   <p:cSld>
     <p:spTree>
@@ -23678,7 +23947,7 @@
 </p:sld>
 </file>
 
-<file path=ppt/slides/slide8.xml><?xml version="1.0" encoding="utf-8"?>
+<file path=ppt/slides/slide9.xml><?xml version="1.0" encoding="utf-8"?>
 <p:sld xmlns:a="http://schemas.openxmlformats.org/drawingml/2006/main" xmlns:r="http://schemas.openxmlformats.org/officeDocument/2006/relationships" xmlns:p="http://schemas.openxmlformats.org/presentationml/2006/main">
   <p:cSld>
     <p:spTree>
@@ -24381,90 +24650,6 @@
 </p:sld>
 </file>
 
-<file path=ppt/slides/slide9.xml><?xml version="1.0" encoding="utf-8"?>
-<p:sld xmlns:a="http://schemas.openxmlformats.org/drawingml/2006/main" xmlns:r="http://schemas.openxmlformats.org/officeDocument/2006/relationships" xmlns:p="http://schemas.openxmlformats.org/presentationml/2006/main">
-  <p:cSld>
-    <p:spTree>
-      <p:nvGrpSpPr>
-        <p:cNvPr id="1" name=""/>
-        <p:cNvGrpSpPr/>
-        <p:nvPr/>
-      </p:nvGrpSpPr>
-      <p:grpSpPr>
-        <a:xfrm>
-          <a:off x="0" y="0"/>
-          <a:ext cx="0" cy="0"/>
-          <a:chOff x="0" y="0"/>
-          <a:chExt cx="0" cy="0"/>
-        </a:xfrm>
-      </p:grpSpPr>
-      <p:sp>
-        <p:nvSpPr>
-          <p:cNvPr id="4" name="Title 3">
-            <a:extLst>
-              <a:ext uri="{FF2B5EF4-FFF2-40B4-BE49-F238E27FC236}">
-                <a16:creationId xmlns:a16="http://schemas.microsoft.com/office/drawing/2014/main" id="{E6CEEF64-A8BD-446D-A249-7B2C71B0E6EA}"/>
-              </a:ext>
-            </a:extLst>
-          </p:cNvPr>
-          <p:cNvSpPr>
-            <a:spLocks noGrp="1"/>
-          </p:cNvSpPr>
-          <p:nvPr>
-            <p:ph type="ctrTitle"/>
-          </p:nvPr>
-        </p:nvSpPr>
-        <p:spPr/>
-        <p:txBody>
-          <a:bodyPr/>
-          <a:lstStyle/>
-          <a:p>
-            <a:r>
-              <a:rPr lang="en-US" dirty="0"/>
-              <a:t>Fin</a:t>
-            </a:r>
-            <a:endParaRPr lang="en-ID" dirty="0"/>
-          </a:p>
-        </p:txBody>
-      </p:sp>
-      <p:sp>
-        <p:nvSpPr>
-          <p:cNvPr id="5" name="Subtitle 4">
-            <a:extLst>
-              <a:ext uri="{FF2B5EF4-FFF2-40B4-BE49-F238E27FC236}">
-                <a16:creationId xmlns:a16="http://schemas.microsoft.com/office/drawing/2014/main" id="{FAD6DC0B-3EF1-45AC-AD1D-595B4A6A0D56}"/>
-              </a:ext>
-            </a:extLst>
-          </p:cNvPr>
-          <p:cNvSpPr>
-            <a:spLocks noGrp="1"/>
-          </p:cNvSpPr>
-          <p:nvPr>
-            <p:ph type="subTitle" idx="1"/>
-          </p:nvPr>
-        </p:nvSpPr>
-        <p:spPr/>
-        <p:txBody>
-          <a:bodyPr/>
-          <a:lstStyle/>
-          <a:p>
-            <a:endParaRPr lang="en-ID"/>
-          </a:p>
-        </p:txBody>
-      </p:sp>
-    </p:spTree>
-    <p:extLst>
-      <p:ext uri="{BB962C8B-B14F-4D97-AF65-F5344CB8AC3E}">
-        <p14:creationId xmlns:p14="http://schemas.microsoft.com/office/powerpoint/2010/main" val="3241407712"/>
-      </p:ext>
-    </p:extLst>
-  </p:cSld>
-  <p:clrMapOvr>
-    <a:masterClrMapping/>
-  </p:clrMapOvr>
-</p:sld>
-</file>
-
 <file path=ppt/theme/theme1.xml><?xml version="1.0" encoding="utf-8"?>
 <a:theme xmlns:a="http://schemas.openxmlformats.org/drawingml/2006/main" name="Office Theme">
   <a:themeElements>

</xml_diff>